<commit_message>
Added the maths of working out De Broglie wavelengths, which I will go through in class.
</commit_message>
<xml_diff>
--- a/chapter1/figures/lecture_1_illustrations.pptx
+++ b/chapter1/figures/lecture_1_illustrations.pptx
@@ -6,14 +6,15 @@
   </p:sldMasterIdLst>
   <p:sldIdLst>
     <p:sldId id="261" r:id="rId2"/>
-    <p:sldId id="260" r:id="rId3"/>
-    <p:sldId id="256" r:id="rId4"/>
+    <p:sldId id="256" r:id="rId3"/>
+    <p:sldId id="260" r:id="rId4"/>
     <p:sldId id="257" r:id="rId5"/>
     <p:sldId id="258" r:id="rId6"/>
     <p:sldId id="259" r:id="rId7"/>
     <p:sldId id="540" r:id="rId8"/>
     <p:sldId id="539" r:id="rId9"/>
-    <p:sldId id="541" r:id="rId10"/>
+    <p:sldId id="542" r:id="rId10"/>
+    <p:sldId id="541" r:id="rId11"/>
   </p:sldIdLst>
   <p:sldSz cx="12192000" cy="6858000"/>
   <p:notesSz cx="6858000" cy="9144000"/>
@@ -3798,6 +3799,408 @@
 </p:sld>
 </file>
 
+<file path=ppt/slides/slide10.xml><?xml version="1.0" encoding="utf-8"?>
+<p:sld xmlns:a="http://schemas.openxmlformats.org/drawingml/2006/main" xmlns:r="http://schemas.openxmlformats.org/officeDocument/2006/relationships" xmlns:p="http://schemas.openxmlformats.org/presentationml/2006/main">
+  <p:cSld>
+    <p:spTree>
+      <p:nvGrpSpPr>
+        <p:cNvPr id="1" name=""/>
+        <p:cNvGrpSpPr/>
+        <p:nvPr/>
+      </p:nvGrpSpPr>
+      <p:grpSpPr>
+        <a:xfrm>
+          <a:off x="0" y="0"/>
+          <a:ext cx="0" cy="0"/>
+          <a:chOff x="0" y="0"/>
+          <a:chExt cx="0" cy="0"/>
+        </a:xfrm>
+      </p:grpSpPr>
+      <p:sp>
+        <p:nvSpPr>
+          <p:cNvPr id="2" name="Title 1">
+            <a:extLst>
+              <a:ext uri="{FF2B5EF4-FFF2-40B4-BE49-F238E27FC236}">
+                <a16:creationId xmlns:a16="http://schemas.microsoft.com/office/drawing/2014/main" id="{14515D0A-11C3-D800-3FB8-CBFC4E3898ED}"/>
+              </a:ext>
+            </a:extLst>
+          </p:cNvPr>
+          <p:cNvSpPr>
+            <a:spLocks noGrp="1"/>
+          </p:cNvSpPr>
+          <p:nvPr>
+            <p:ph type="ctrTitle"/>
+          </p:nvPr>
+        </p:nvSpPr>
+        <p:spPr>
+          <a:xfrm>
+            <a:off x="4771767" y="262248"/>
+            <a:ext cx="2648465" cy="641195"/>
+          </a:xfrm>
+        </p:spPr>
+        <p:txBody>
+          <a:bodyPr>
+            <a:normAutofit fontScale="90000"/>
+          </a:bodyPr>
+          <a:lstStyle/>
+          <a:p>
+            <a:r>
+              <a:rPr lang="en-US" sz="4000" dirty="0"/>
+              <a:t>Summary</a:t>
+            </a:r>
+          </a:p>
+        </p:txBody>
+      </p:sp>
+      <p:sp>
+        <p:nvSpPr>
+          <p:cNvPr id="3" name="Subtitle 2">
+            <a:extLst>
+              <a:ext uri="{FF2B5EF4-FFF2-40B4-BE49-F238E27FC236}">
+                <a16:creationId xmlns:a16="http://schemas.microsoft.com/office/drawing/2014/main" id="{45B757EE-EFCD-EB5D-4CE9-E5E8ACCFD8D4}"/>
+              </a:ext>
+            </a:extLst>
+          </p:cNvPr>
+          <p:cNvSpPr>
+            <a:spLocks noGrp="1"/>
+          </p:cNvSpPr>
+          <p:nvPr>
+            <p:ph type="subTitle" idx="1"/>
+          </p:nvPr>
+        </p:nvSpPr>
+        <p:spPr>
+          <a:xfrm>
+            <a:off x="866077" y="713872"/>
+            <a:ext cx="10742341" cy="2497680"/>
+          </a:xfrm>
+        </p:spPr>
+        <p:txBody>
+          <a:bodyPr>
+            <a:normAutofit lnSpcReduction="10000"/>
+          </a:bodyPr>
+          <a:lstStyle/>
+          <a:p>
+            <a:pPr algn="l"/>
+            <a:r>
+              <a:rPr lang="en-US" dirty="0"/>
+              <a:t>WIMPs </a:t>
+            </a:r>
+          </a:p>
+          <a:p>
+            <a:pPr marL="342900" indent="-342900" algn="l">
+              <a:buFont typeface="Arial" panose="020B0604020202020204" pitchFamily="34" charset="0"/>
+              <a:buChar char="•"/>
+            </a:pPr>
+            <a:r>
+              <a:rPr lang="en-US" dirty="0"/>
+              <a:t>Originate in high energy accelerator ‘frontier’ new physics.</a:t>
+            </a:r>
+          </a:p>
+          <a:p>
+            <a:pPr marL="342900" indent="-342900" algn="l">
+              <a:buFont typeface="Arial" panose="020B0604020202020204" pitchFamily="34" charset="0"/>
+              <a:buChar char="•"/>
+            </a:pPr>
+            <a:r>
+              <a:rPr lang="en-US" dirty="0"/>
+              <a:t>Are associated with the weak interactions, so the WIMP mass is within a couple of orders of magnitude of 100 GeV/c</a:t>
+            </a:r>
+            <a:r>
+              <a:rPr lang="en-US" baseline="30000" dirty="0"/>
+              <a:t>2</a:t>
+            </a:r>
+            <a:r>
+              <a:rPr lang="en-US" dirty="0"/>
+              <a:t>.</a:t>
+            </a:r>
+          </a:p>
+          <a:p>
+            <a:pPr marL="342900" indent="-342900" algn="l">
+              <a:buFont typeface="Arial" panose="020B0604020202020204" pitchFamily="34" charset="0"/>
+              <a:buChar char="•"/>
+            </a:pPr>
+            <a:r>
+              <a:rPr lang="en-US" dirty="0"/>
+              <a:t>Are particle-like, if they are dark matter.</a:t>
+            </a:r>
+          </a:p>
+          <a:p>
+            <a:pPr marL="342900" indent="-342900" algn="l">
+              <a:buFont typeface="Arial" panose="020B0604020202020204" pitchFamily="34" charset="0"/>
+              <a:buChar char="•"/>
+            </a:pPr>
+            <a:r>
+              <a:rPr lang="en-US" dirty="0"/>
+              <a:t>Have De Broglie wavelengths of order the diameter of a nucleus.</a:t>
+            </a:r>
+          </a:p>
+        </p:txBody>
+      </p:sp>
+      <p:sp>
+        <p:nvSpPr>
+          <p:cNvPr id="4" name="Subtitle 2">
+            <a:extLst>
+              <a:ext uri="{FF2B5EF4-FFF2-40B4-BE49-F238E27FC236}">
+                <a16:creationId xmlns:a16="http://schemas.microsoft.com/office/drawing/2014/main" id="{86F48EB1-8AD9-B14B-D6F5-D92021CCA15C}"/>
+              </a:ext>
+            </a:extLst>
+          </p:cNvPr>
+          <p:cNvSpPr txBox="1">
+            <a:spLocks/>
+          </p:cNvSpPr>
+          <p:nvPr/>
+        </p:nvSpPr>
+        <p:spPr>
+          <a:xfrm>
+            <a:off x="866076" y="3319541"/>
+            <a:ext cx="10742341" cy="2497680"/>
+          </a:xfrm>
+          <a:prstGeom prst="rect">
+            <a:avLst/>
+          </a:prstGeom>
+        </p:spPr>
+        <p:txBody>
+          <a:bodyPr vert="horz" lIns="91440" tIns="45720" rIns="91440" bIns="45720" rtlCol="0">
+            <a:normAutofit fontScale="92500" lnSpcReduction="20000"/>
+          </a:bodyPr>
+          <a:lstStyle>
+            <a:lvl1pPr marL="0" indent="0" algn="ctr" defTabSz="914400" rtl="0" eaLnBrk="1" latinLnBrk="0" hangingPunct="1">
+              <a:lnSpc>
+                <a:spcPct val="90000"/>
+              </a:lnSpc>
+              <a:spcBef>
+                <a:spcPts val="1000"/>
+              </a:spcBef>
+              <a:buFont typeface="Arial" panose="020B0604020202020204" pitchFamily="34" charset="0"/>
+              <a:buNone/>
+              <a:defRPr sz="2400" kern="1200">
+                <a:solidFill>
+                  <a:schemeClr val="tx1"/>
+                </a:solidFill>
+                <a:latin typeface="+mn-lt"/>
+                <a:ea typeface="+mn-ea"/>
+                <a:cs typeface="+mn-cs"/>
+              </a:defRPr>
+            </a:lvl1pPr>
+            <a:lvl2pPr marL="457200" indent="0" algn="ctr" defTabSz="914400" rtl="0" eaLnBrk="1" latinLnBrk="0" hangingPunct="1">
+              <a:lnSpc>
+                <a:spcPct val="90000"/>
+              </a:lnSpc>
+              <a:spcBef>
+                <a:spcPts val="500"/>
+              </a:spcBef>
+              <a:buFont typeface="Arial" panose="020B0604020202020204" pitchFamily="34" charset="0"/>
+              <a:buNone/>
+              <a:defRPr sz="2000" kern="1200">
+                <a:solidFill>
+                  <a:schemeClr val="tx1"/>
+                </a:solidFill>
+                <a:latin typeface="+mn-lt"/>
+                <a:ea typeface="+mn-ea"/>
+                <a:cs typeface="+mn-cs"/>
+              </a:defRPr>
+            </a:lvl2pPr>
+            <a:lvl3pPr marL="914400" indent="0" algn="ctr" defTabSz="914400" rtl="0" eaLnBrk="1" latinLnBrk="0" hangingPunct="1">
+              <a:lnSpc>
+                <a:spcPct val="90000"/>
+              </a:lnSpc>
+              <a:spcBef>
+                <a:spcPts val="500"/>
+              </a:spcBef>
+              <a:buFont typeface="Arial" panose="020B0604020202020204" pitchFamily="34" charset="0"/>
+              <a:buNone/>
+              <a:defRPr sz="1800" kern="1200">
+                <a:solidFill>
+                  <a:schemeClr val="tx1"/>
+                </a:solidFill>
+                <a:latin typeface="+mn-lt"/>
+                <a:ea typeface="+mn-ea"/>
+                <a:cs typeface="+mn-cs"/>
+              </a:defRPr>
+            </a:lvl3pPr>
+            <a:lvl4pPr marL="1371600" indent="0" algn="ctr" defTabSz="914400" rtl="0" eaLnBrk="1" latinLnBrk="0" hangingPunct="1">
+              <a:lnSpc>
+                <a:spcPct val="90000"/>
+              </a:lnSpc>
+              <a:spcBef>
+                <a:spcPts val="500"/>
+              </a:spcBef>
+              <a:buFont typeface="Arial" panose="020B0604020202020204" pitchFamily="34" charset="0"/>
+              <a:buNone/>
+              <a:defRPr sz="1600" kern="1200">
+                <a:solidFill>
+                  <a:schemeClr val="tx1"/>
+                </a:solidFill>
+                <a:latin typeface="+mn-lt"/>
+                <a:ea typeface="+mn-ea"/>
+                <a:cs typeface="+mn-cs"/>
+              </a:defRPr>
+            </a:lvl4pPr>
+            <a:lvl5pPr marL="1828800" indent="0" algn="ctr" defTabSz="914400" rtl="0" eaLnBrk="1" latinLnBrk="0" hangingPunct="1">
+              <a:lnSpc>
+                <a:spcPct val="90000"/>
+              </a:lnSpc>
+              <a:spcBef>
+                <a:spcPts val="500"/>
+              </a:spcBef>
+              <a:buFont typeface="Arial" panose="020B0604020202020204" pitchFamily="34" charset="0"/>
+              <a:buNone/>
+              <a:defRPr sz="1600" kern="1200">
+                <a:solidFill>
+                  <a:schemeClr val="tx1"/>
+                </a:solidFill>
+                <a:latin typeface="+mn-lt"/>
+                <a:ea typeface="+mn-ea"/>
+                <a:cs typeface="+mn-cs"/>
+              </a:defRPr>
+            </a:lvl5pPr>
+            <a:lvl6pPr marL="2286000" indent="0" algn="ctr" defTabSz="914400" rtl="0" eaLnBrk="1" latinLnBrk="0" hangingPunct="1">
+              <a:lnSpc>
+                <a:spcPct val="90000"/>
+              </a:lnSpc>
+              <a:spcBef>
+                <a:spcPts val="500"/>
+              </a:spcBef>
+              <a:buFont typeface="Arial" panose="020B0604020202020204" pitchFamily="34" charset="0"/>
+              <a:buNone/>
+              <a:defRPr sz="1600" kern="1200">
+                <a:solidFill>
+                  <a:schemeClr val="tx1"/>
+                </a:solidFill>
+                <a:latin typeface="+mn-lt"/>
+                <a:ea typeface="+mn-ea"/>
+                <a:cs typeface="+mn-cs"/>
+              </a:defRPr>
+            </a:lvl6pPr>
+            <a:lvl7pPr marL="2743200" indent="0" algn="ctr" defTabSz="914400" rtl="0" eaLnBrk="1" latinLnBrk="0" hangingPunct="1">
+              <a:lnSpc>
+                <a:spcPct val="90000"/>
+              </a:lnSpc>
+              <a:spcBef>
+                <a:spcPts val="500"/>
+              </a:spcBef>
+              <a:buFont typeface="Arial" panose="020B0604020202020204" pitchFamily="34" charset="0"/>
+              <a:buNone/>
+              <a:defRPr sz="1600" kern="1200">
+                <a:solidFill>
+                  <a:schemeClr val="tx1"/>
+                </a:solidFill>
+                <a:latin typeface="+mn-lt"/>
+                <a:ea typeface="+mn-ea"/>
+                <a:cs typeface="+mn-cs"/>
+              </a:defRPr>
+            </a:lvl7pPr>
+            <a:lvl8pPr marL="3200400" indent="0" algn="ctr" defTabSz="914400" rtl="0" eaLnBrk="1" latinLnBrk="0" hangingPunct="1">
+              <a:lnSpc>
+                <a:spcPct val="90000"/>
+              </a:lnSpc>
+              <a:spcBef>
+                <a:spcPts val="500"/>
+              </a:spcBef>
+              <a:buFont typeface="Arial" panose="020B0604020202020204" pitchFamily="34" charset="0"/>
+              <a:buNone/>
+              <a:defRPr sz="1600" kern="1200">
+                <a:solidFill>
+                  <a:schemeClr val="tx1"/>
+                </a:solidFill>
+                <a:latin typeface="+mn-lt"/>
+                <a:ea typeface="+mn-ea"/>
+                <a:cs typeface="+mn-cs"/>
+              </a:defRPr>
+            </a:lvl8pPr>
+            <a:lvl9pPr marL="3657600" indent="0" algn="ctr" defTabSz="914400" rtl="0" eaLnBrk="1" latinLnBrk="0" hangingPunct="1">
+              <a:lnSpc>
+                <a:spcPct val="90000"/>
+              </a:lnSpc>
+              <a:spcBef>
+                <a:spcPts val="500"/>
+              </a:spcBef>
+              <a:buFont typeface="Arial" panose="020B0604020202020204" pitchFamily="34" charset="0"/>
+              <a:buNone/>
+              <a:defRPr sz="1600" kern="1200">
+                <a:solidFill>
+                  <a:schemeClr val="tx1"/>
+                </a:solidFill>
+                <a:latin typeface="+mn-lt"/>
+                <a:ea typeface="+mn-ea"/>
+                <a:cs typeface="+mn-cs"/>
+              </a:defRPr>
+            </a:lvl9pPr>
+          </a:lstStyle>
+          <a:p>
+            <a:pPr algn="l"/>
+            <a:r>
+              <a:rPr lang="en-US" dirty="0"/>
+              <a:t>Axions </a:t>
+            </a:r>
+          </a:p>
+          <a:p>
+            <a:pPr marL="342900" indent="-342900" algn="l">
+              <a:buFont typeface="Arial" panose="020B0604020202020204" pitchFamily="34" charset="0"/>
+              <a:buChar char="•"/>
+            </a:pPr>
+            <a:r>
+              <a:rPr lang="en-US" dirty="0"/>
+              <a:t>Originate as a by-product of the Peccei Quinn mechanism introduced to explain why strongly interacting hadrons are CP-symmetric in the low energy limit.</a:t>
+            </a:r>
+          </a:p>
+          <a:p>
+            <a:pPr marL="342900" indent="-342900" algn="l">
+              <a:buFont typeface="Arial" panose="020B0604020202020204" pitchFamily="34" charset="0"/>
+              <a:buChar char="•"/>
+            </a:pPr>
+            <a:r>
+              <a:rPr lang="en-US" dirty="0"/>
+              <a:t>Are associated with the strong interactions, so the axion mass is far lower than the WIMP mass, with its mass constrained by astrophysical observations and cosmological arguments. See a later lecture for further </a:t>
+            </a:r>
+            <a:r>
+              <a:rPr lang="en-US" dirty="0" err="1"/>
+              <a:t>disussion</a:t>
+            </a:r>
+            <a:endParaRPr lang="en-US" dirty="0"/>
+          </a:p>
+          <a:p>
+            <a:pPr marL="342900" indent="-342900" algn="l">
+              <a:buFont typeface="Arial" panose="020B0604020202020204" pitchFamily="34" charset="0"/>
+              <a:buChar char="•"/>
+            </a:pPr>
+            <a:r>
+              <a:rPr lang="en-US" dirty="0"/>
+              <a:t>Are wave-like, if they are dark matter.</a:t>
+            </a:r>
+          </a:p>
+          <a:p>
+            <a:pPr marL="342900" indent="-342900" algn="l">
+              <a:buFont typeface="Arial" panose="020B0604020202020204" pitchFamily="34" charset="0"/>
+              <a:buChar char="•"/>
+            </a:pPr>
+            <a:r>
+              <a:rPr lang="en-US" dirty="0"/>
+              <a:t>Have De Broglie wavelengths of order a hundred </a:t>
+            </a:r>
+            <a:r>
+              <a:rPr lang="en-US" dirty="0" err="1"/>
+              <a:t>metres</a:t>
+            </a:r>
+            <a:r>
+              <a:rPr lang="en-US" dirty="0"/>
+              <a:t>.</a:t>
+            </a:r>
+          </a:p>
+        </p:txBody>
+      </p:sp>
+    </p:spTree>
+    <p:extLst>
+      <p:ext uri="{BB962C8B-B14F-4D97-AF65-F5344CB8AC3E}">
+        <p14:creationId xmlns:p14="http://schemas.microsoft.com/office/powerpoint/2010/main" val="745341166"/>
+      </p:ext>
+    </p:extLst>
+  </p:cSld>
+  <p:clrMapOvr>
+    <a:masterClrMapping/>
+  </p:clrMapOvr>
+</p:sld>
+</file>
+
 <file path=ppt/slides/slide2.xml><?xml version="1.0" encoding="utf-8"?>
 <p:sld xmlns:a="http://schemas.openxmlformats.org/drawingml/2006/main" xmlns:r="http://schemas.openxmlformats.org/officeDocument/2006/relationships" xmlns:p="http://schemas.openxmlformats.org/presentationml/2006/main">
   <p:cSld>
@@ -3817,10 +4220,10 @@
       </p:grpSpPr>
       <p:pic>
         <p:nvPicPr>
-          <p:cNvPr id="3" name="Picture 2" descr="A diagram of a complex structure&#10;&#10;Description automatically generated with medium confidence">
-            <a:extLst>
-              <a:ext uri="{FF2B5EF4-FFF2-40B4-BE49-F238E27FC236}">
-                <a16:creationId xmlns:a16="http://schemas.microsoft.com/office/drawing/2014/main" id="{E8E14C86-5444-CCA2-57F0-AA50C336D43D}"/>
+          <p:cNvPr id="5" name="Picture 4" descr="A chart of different types of physics&#10;&#10;Description automatically generated">
+            <a:extLst>
+              <a:ext uri="{FF2B5EF4-FFF2-40B4-BE49-F238E27FC236}">
+                <a16:creationId xmlns:a16="http://schemas.microsoft.com/office/drawing/2014/main" id="{9D70F595-8675-1604-E46A-4E82DB0C699F}"/>
               </a:ext>
             </a:extLst>
           </p:cNvPr>
@@ -3837,8 +4240,8 @@
         </p:blipFill>
         <p:spPr>
           <a:xfrm>
-            <a:off x="2364088" y="932590"/>
-            <a:ext cx="7463824" cy="5181891"/>
+            <a:off x="3411752" y="1209115"/>
+            <a:ext cx="5368496" cy="4439769"/>
           </a:xfrm>
           <a:prstGeom prst="rect">
             <a:avLst/>
@@ -3848,7 +4251,7 @@
     </p:spTree>
     <p:extLst>
       <p:ext uri="{BB962C8B-B14F-4D97-AF65-F5344CB8AC3E}">
-        <p14:creationId xmlns:p14="http://schemas.microsoft.com/office/powerpoint/2010/main" val="3279623787"/>
+        <p14:creationId xmlns:p14="http://schemas.microsoft.com/office/powerpoint/2010/main" val="3126389378"/>
       </p:ext>
     </p:extLst>
   </p:cSld>
@@ -3877,10 +4280,10 @@
       </p:grpSpPr>
       <p:pic>
         <p:nvPicPr>
-          <p:cNvPr id="5" name="Picture 4" descr="A chart of different types of physics&#10;&#10;Description automatically generated">
-            <a:extLst>
-              <a:ext uri="{FF2B5EF4-FFF2-40B4-BE49-F238E27FC236}">
-                <a16:creationId xmlns:a16="http://schemas.microsoft.com/office/drawing/2014/main" id="{9D70F595-8675-1604-E46A-4E82DB0C699F}"/>
+          <p:cNvPr id="3" name="Picture 2" descr="A diagram of a complex structure&#10;&#10;Description automatically generated with medium confidence">
+            <a:extLst>
+              <a:ext uri="{FF2B5EF4-FFF2-40B4-BE49-F238E27FC236}">
+                <a16:creationId xmlns:a16="http://schemas.microsoft.com/office/drawing/2014/main" id="{E8E14C86-5444-CCA2-57F0-AA50C336D43D}"/>
               </a:ext>
             </a:extLst>
           </p:cNvPr>
@@ -3897,8 +4300,8 @@
         </p:blipFill>
         <p:spPr>
           <a:xfrm>
-            <a:off x="3411752" y="1209115"/>
-            <a:ext cx="5368496" cy="4439769"/>
+            <a:off x="2364088" y="932590"/>
+            <a:ext cx="7463824" cy="5181891"/>
           </a:xfrm>
           <a:prstGeom prst="rect">
             <a:avLst/>
@@ -3908,7 +4311,7 @@
     </p:spTree>
     <p:extLst>
       <p:ext uri="{BB962C8B-B14F-4D97-AF65-F5344CB8AC3E}">
-        <p14:creationId xmlns:p14="http://schemas.microsoft.com/office/powerpoint/2010/main" val="3126389378"/>
+        <p14:creationId xmlns:p14="http://schemas.microsoft.com/office/powerpoint/2010/main" val="3279623787"/>
       </p:ext>
     </p:extLst>
   </p:cSld>
@@ -4462,7 +4865,7 @@
             <a:effectLst/>
             <a:extLst>
               <a:ext uri="{C572A759-6A51-4108-AA02-DFA0A04FC94B}">
-                <ma14:wrappingTextBoxFlag xmlns="" xmlns:m="http://schemas.openxmlformats.org/officeDocument/2006/math" xmlns:a14="http://schemas.microsoft.com/office/drawing/2010/main" xmlns:ma14="http://schemas.microsoft.com/office/mac/drawingml/2011/main" val="1"/>
+                <ma14:wrappingTextBoxFlag xmlns:ma14="http://schemas.microsoft.com/office/mac/drawingml/2011/main" xmlns:a14="http://schemas.microsoft.com/office/drawing/2010/main" xmlns:m="http://schemas.openxmlformats.org/officeDocument/2006/math" xmlns="" val="1"/>
               </a:ext>
             </a:extLst>
           </p:spPr>
@@ -4629,7 +5032,7 @@
           <a:effectLst/>
           <a:extLst>
             <a:ext uri="{C572A759-6A51-4108-AA02-DFA0A04FC94B}">
-              <ma14:wrappingTextBoxFlag xmlns="" xmlns:m="http://schemas.openxmlformats.org/officeDocument/2006/math" xmlns:a14="http://schemas.microsoft.com/office/drawing/2010/main" xmlns:ma14="http://schemas.microsoft.com/office/mac/drawingml/2011/main" val="1"/>
+              <ma14:wrappingTextBoxFlag xmlns:ma14="http://schemas.microsoft.com/office/mac/drawingml/2011/main" xmlns:a14="http://schemas.microsoft.com/office/drawing/2010/main" xmlns:m="http://schemas.openxmlformats.org/officeDocument/2006/math" xmlns="" val="1"/>
             </a:ext>
           </a:extLst>
         </p:spPr>
@@ -4721,377 +5124,271 @@
           <p:cNvPr id="2" name="Title 1">
             <a:extLst>
               <a:ext uri="{FF2B5EF4-FFF2-40B4-BE49-F238E27FC236}">
-                <a16:creationId xmlns:a16="http://schemas.microsoft.com/office/drawing/2014/main" id="{14515D0A-11C3-D800-3FB8-CBFC4E3898ED}"/>
-              </a:ext>
-            </a:extLst>
-          </p:cNvPr>
-          <p:cNvSpPr>
-            <a:spLocks noGrp="1"/>
-          </p:cNvSpPr>
-          <p:nvPr>
-            <p:ph type="ctrTitle"/>
+                <a16:creationId xmlns:a16="http://schemas.microsoft.com/office/drawing/2014/main" id="{58E6A146-5A9E-974B-04F0-184F4F624C1B}"/>
+              </a:ext>
+            </a:extLst>
+          </p:cNvPr>
+          <p:cNvSpPr>
+            <a:spLocks noGrp="1"/>
+          </p:cNvSpPr>
+          <p:nvPr>
+            <p:ph type="title"/>
           </p:nvPr>
         </p:nvSpPr>
         <p:spPr>
           <a:xfrm>
-            <a:off x="4771767" y="262248"/>
-            <a:ext cx="2648465" cy="641195"/>
+            <a:off x="270132" y="272729"/>
+            <a:ext cx="10515600" cy="1325563"/>
           </a:xfrm>
         </p:spPr>
         <p:txBody>
-          <a:bodyPr>
-            <a:normAutofit fontScale="90000"/>
-          </a:bodyPr>
+          <a:bodyPr/>
           <a:lstStyle/>
           <a:p>
             <a:r>
-              <a:rPr lang="en-US" sz="4000" dirty="0"/>
-              <a:t>Summary</a:t>
-            </a:r>
-          </a:p>
-        </p:txBody>
-      </p:sp>
-      <p:sp>
-        <p:nvSpPr>
-          <p:cNvPr id="3" name="Subtitle 2">
-            <a:extLst>
-              <a:ext uri="{FF2B5EF4-FFF2-40B4-BE49-F238E27FC236}">
-                <a16:creationId xmlns:a16="http://schemas.microsoft.com/office/drawing/2014/main" id="{45B757EE-EFCD-EB5D-4CE9-E5E8ACCFD8D4}"/>
-              </a:ext>
-            </a:extLst>
-          </p:cNvPr>
-          <p:cNvSpPr>
-            <a:spLocks noGrp="1"/>
-          </p:cNvSpPr>
-          <p:nvPr>
-            <p:ph type="subTitle" idx="1"/>
-          </p:nvPr>
-        </p:nvSpPr>
+              <a:rPr lang="en-US" dirty="0"/>
+              <a:t>’Easy’ way to work out the De Broglie wavelength from the momentum</a:t>
+            </a:r>
+          </a:p>
+        </p:txBody>
+      </p:sp>
+      <p:pic>
+        <p:nvPicPr>
+          <p:cNvPr id="3" name="Picture 2">
+            <a:extLst>
+              <a:ext uri="{FF2B5EF4-FFF2-40B4-BE49-F238E27FC236}">
+                <a16:creationId xmlns:a16="http://schemas.microsoft.com/office/drawing/2014/main" id="{A5BA690E-0163-B616-E9CE-BBB9C6535342}"/>
+              </a:ext>
+            </a:extLst>
+          </p:cNvPr>
+          <p:cNvPicPr>
+            <a:picLocks noChangeAspect="1"/>
+          </p:cNvPicPr>
+          <p:nvPr/>
+        </p:nvPicPr>
+        <p:blipFill>
+          <a:blip r:embed="rId2"/>
+          <a:stretch>
+            <a:fillRect/>
+          </a:stretch>
+        </p:blipFill>
         <p:spPr>
           <a:xfrm>
-            <a:off x="866077" y="713872"/>
-            <a:ext cx="10742341" cy="2497680"/>
-          </a:xfrm>
-        </p:spPr>
-        <p:txBody>
-          <a:bodyPr>
-            <a:normAutofit lnSpcReduction="10000"/>
-          </a:bodyPr>
-          <a:lstStyle/>
-          <a:p>
-            <a:pPr algn="l"/>
-            <a:r>
-              <a:rPr lang="en-US" dirty="0"/>
-              <a:t>WIMPs </a:t>
-            </a:r>
-          </a:p>
-          <a:p>
-            <a:pPr marL="342900" indent="-342900" algn="l">
-              <a:buFont typeface="Arial" panose="020B0604020202020204" pitchFamily="34" charset="0"/>
-              <a:buChar char="•"/>
-            </a:pPr>
-            <a:r>
-              <a:rPr lang="en-US" dirty="0"/>
-              <a:t>Originate in high energy accelerator ‘frontier’ new physics.</a:t>
-            </a:r>
-          </a:p>
-          <a:p>
-            <a:pPr marL="342900" indent="-342900" algn="l">
-              <a:buFont typeface="Arial" panose="020B0604020202020204" pitchFamily="34" charset="0"/>
-              <a:buChar char="•"/>
-            </a:pPr>
-            <a:r>
-              <a:rPr lang="en-US" dirty="0"/>
-              <a:t>Are associated with the weak interactions, so the WIMP mass is within a couple of orders of magnitude of 100 GeV/c</a:t>
-            </a:r>
-            <a:r>
-              <a:rPr lang="en-US" baseline="30000" dirty="0"/>
-              <a:t>2</a:t>
-            </a:r>
-            <a:r>
-              <a:rPr lang="en-US" dirty="0"/>
-              <a:t>.</a:t>
-            </a:r>
-          </a:p>
-          <a:p>
-            <a:pPr marL="342900" indent="-342900" algn="l">
-              <a:buFont typeface="Arial" panose="020B0604020202020204" pitchFamily="34" charset="0"/>
-              <a:buChar char="•"/>
-            </a:pPr>
-            <a:r>
-              <a:rPr lang="en-US" dirty="0"/>
-              <a:t>Are particle-like, if they are dark matter.</a:t>
-            </a:r>
-          </a:p>
-          <a:p>
-            <a:pPr marL="342900" indent="-342900" algn="l">
-              <a:buFont typeface="Arial" panose="020B0604020202020204" pitchFamily="34" charset="0"/>
-              <a:buChar char="•"/>
-            </a:pPr>
-            <a:r>
-              <a:rPr lang="en-US" dirty="0"/>
-              <a:t>Have De Broglie wavelengths of order the diameter of a nucleus.</a:t>
-            </a:r>
-          </a:p>
-        </p:txBody>
-      </p:sp>
-      <p:sp>
-        <p:nvSpPr>
-          <p:cNvPr id="4" name="Subtitle 2">
-            <a:extLst>
-              <a:ext uri="{FF2B5EF4-FFF2-40B4-BE49-F238E27FC236}">
-                <a16:creationId xmlns:a16="http://schemas.microsoft.com/office/drawing/2014/main" id="{86F48EB1-8AD9-B14B-D6F5-D92021CCA15C}"/>
-              </a:ext>
-            </a:extLst>
-          </p:cNvPr>
-          <p:cNvSpPr txBox="1">
-            <a:spLocks/>
-          </p:cNvSpPr>
-          <p:nvPr/>
-        </p:nvSpPr>
-        <p:spPr>
-          <a:xfrm>
-            <a:off x="866076" y="3319541"/>
-            <a:ext cx="10742341" cy="2497680"/>
+            <a:off x="9077068" y="414810"/>
+            <a:ext cx="2844800" cy="1041400"/>
           </a:xfrm>
           <a:prstGeom prst="rect">
             <a:avLst/>
           </a:prstGeom>
         </p:spPr>
-        <p:txBody>
-          <a:bodyPr vert="horz" lIns="91440" tIns="45720" rIns="91440" bIns="45720" rtlCol="0">
-            <a:normAutofit fontScale="92500" lnSpcReduction="20000"/>
+      </p:pic>
+      <p:sp>
+        <p:nvSpPr>
+          <p:cNvPr id="4" name="TextBox 3">
+            <a:extLst>
+              <a:ext uri="{FF2B5EF4-FFF2-40B4-BE49-F238E27FC236}">
+                <a16:creationId xmlns:a16="http://schemas.microsoft.com/office/drawing/2014/main" id="{75BCB9A2-0A47-13B4-52B3-B706735B79E6}"/>
+              </a:ext>
+            </a:extLst>
+          </p:cNvPr>
+          <p:cNvSpPr txBox="1"/>
+          <p:nvPr/>
+        </p:nvSpPr>
+        <p:spPr>
+          <a:xfrm>
+            <a:off x="270132" y="1958546"/>
+            <a:ext cx="4319837" cy="523220"/>
+          </a:xfrm>
+          <a:prstGeom prst="rect">
+            <a:avLst/>
+          </a:prstGeom>
+          <a:noFill/>
+        </p:spPr>
+        <p:txBody>
+          <a:bodyPr wrap="none" rtlCol="0">
+            <a:spAutoFit/>
           </a:bodyPr>
-          <a:lstStyle>
-            <a:lvl1pPr marL="0" indent="0" algn="ctr" defTabSz="914400" rtl="0" eaLnBrk="1" latinLnBrk="0" hangingPunct="1">
-              <a:lnSpc>
-                <a:spcPct val="90000"/>
-              </a:lnSpc>
-              <a:spcBef>
-                <a:spcPts val="1000"/>
-              </a:spcBef>
-              <a:buFont typeface="Arial" panose="020B0604020202020204" pitchFamily="34" charset="0"/>
-              <a:buNone/>
-              <a:defRPr sz="2400" kern="1200">
-                <a:solidFill>
-                  <a:schemeClr val="tx1"/>
-                </a:solidFill>
-                <a:latin typeface="+mn-lt"/>
-                <a:ea typeface="+mn-ea"/>
-                <a:cs typeface="+mn-cs"/>
-              </a:defRPr>
-            </a:lvl1pPr>
-            <a:lvl2pPr marL="457200" indent="0" algn="ctr" defTabSz="914400" rtl="0" eaLnBrk="1" latinLnBrk="0" hangingPunct="1">
-              <a:lnSpc>
-                <a:spcPct val="90000"/>
-              </a:lnSpc>
-              <a:spcBef>
-                <a:spcPts val="500"/>
-              </a:spcBef>
-              <a:buFont typeface="Arial" panose="020B0604020202020204" pitchFamily="34" charset="0"/>
-              <a:buNone/>
-              <a:defRPr sz="2000" kern="1200">
-                <a:solidFill>
-                  <a:schemeClr val="tx1"/>
-                </a:solidFill>
-                <a:latin typeface="+mn-lt"/>
-                <a:ea typeface="+mn-ea"/>
-                <a:cs typeface="+mn-cs"/>
-              </a:defRPr>
-            </a:lvl2pPr>
-            <a:lvl3pPr marL="914400" indent="0" algn="ctr" defTabSz="914400" rtl="0" eaLnBrk="1" latinLnBrk="0" hangingPunct="1">
-              <a:lnSpc>
-                <a:spcPct val="90000"/>
-              </a:lnSpc>
-              <a:spcBef>
-                <a:spcPts val="500"/>
-              </a:spcBef>
-              <a:buFont typeface="Arial" panose="020B0604020202020204" pitchFamily="34" charset="0"/>
-              <a:buNone/>
-              <a:defRPr sz="1800" kern="1200">
-                <a:solidFill>
-                  <a:schemeClr val="tx1"/>
-                </a:solidFill>
-                <a:latin typeface="+mn-lt"/>
-                <a:ea typeface="+mn-ea"/>
-                <a:cs typeface="+mn-cs"/>
-              </a:defRPr>
-            </a:lvl3pPr>
-            <a:lvl4pPr marL="1371600" indent="0" algn="ctr" defTabSz="914400" rtl="0" eaLnBrk="1" latinLnBrk="0" hangingPunct="1">
-              <a:lnSpc>
-                <a:spcPct val="90000"/>
-              </a:lnSpc>
-              <a:spcBef>
-                <a:spcPts val="500"/>
-              </a:spcBef>
-              <a:buFont typeface="Arial" panose="020B0604020202020204" pitchFamily="34" charset="0"/>
-              <a:buNone/>
-              <a:defRPr sz="1600" kern="1200">
-                <a:solidFill>
-                  <a:schemeClr val="tx1"/>
-                </a:solidFill>
-                <a:latin typeface="+mn-lt"/>
-                <a:ea typeface="+mn-ea"/>
-                <a:cs typeface="+mn-cs"/>
-              </a:defRPr>
-            </a:lvl4pPr>
-            <a:lvl5pPr marL="1828800" indent="0" algn="ctr" defTabSz="914400" rtl="0" eaLnBrk="1" latinLnBrk="0" hangingPunct="1">
-              <a:lnSpc>
-                <a:spcPct val="90000"/>
-              </a:lnSpc>
-              <a:spcBef>
-                <a:spcPts val="500"/>
-              </a:spcBef>
-              <a:buFont typeface="Arial" panose="020B0604020202020204" pitchFamily="34" charset="0"/>
-              <a:buNone/>
-              <a:defRPr sz="1600" kern="1200">
-                <a:solidFill>
-                  <a:schemeClr val="tx1"/>
-                </a:solidFill>
-                <a:latin typeface="+mn-lt"/>
-                <a:ea typeface="+mn-ea"/>
-                <a:cs typeface="+mn-cs"/>
-              </a:defRPr>
-            </a:lvl5pPr>
-            <a:lvl6pPr marL="2286000" indent="0" algn="ctr" defTabSz="914400" rtl="0" eaLnBrk="1" latinLnBrk="0" hangingPunct="1">
-              <a:lnSpc>
-                <a:spcPct val="90000"/>
-              </a:lnSpc>
-              <a:spcBef>
-                <a:spcPts val="500"/>
-              </a:spcBef>
-              <a:buFont typeface="Arial" panose="020B0604020202020204" pitchFamily="34" charset="0"/>
-              <a:buNone/>
-              <a:defRPr sz="1600" kern="1200">
-                <a:solidFill>
-                  <a:schemeClr val="tx1"/>
-                </a:solidFill>
-                <a:latin typeface="+mn-lt"/>
-                <a:ea typeface="+mn-ea"/>
-                <a:cs typeface="+mn-cs"/>
-              </a:defRPr>
-            </a:lvl6pPr>
-            <a:lvl7pPr marL="2743200" indent="0" algn="ctr" defTabSz="914400" rtl="0" eaLnBrk="1" latinLnBrk="0" hangingPunct="1">
-              <a:lnSpc>
-                <a:spcPct val="90000"/>
-              </a:lnSpc>
-              <a:spcBef>
-                <a:spcPts val="500"/>
-              </a:spcBef>
-              <a:buFont typeface="Arial" panose="020B0604020202020204" pitchFamily="34" charset="0"/>
-              <a:buNone/>
-              <a:defRPr sz="1600" kern="1200">
-                <a:solidFill>
-                  <a:schemeClr val="tx1"/>
-                </a:solidFill>
-                <a:latin typeface="+mn-lt"/>
-                <a:ea typeface="+mn-ea"/>
-                <a:cs typeface="+mn-cs"/>
-              </a:defRPr>
-            </a:lvl7pPr>
-            <a:lvl8pPr marL="3200400" indent="0" algn="ctr" defTabSz="914400" rtl="0" eaLnBrk="1" latinLnBrk="0" hangingPunct="1">
-              <a:lnSpc>
-                <a:spcPct val="90000"/>
-              </a:lnSpc>
-              <a:spcBef>
-                <a:spcPts val="500"/>
-              </a:spcBef>
-              <a:buFont typeface="Arial" panose="020B0604020202020204" pitchFamily="34" charset="0"/>
-              <a:buNone/>
-              <a:defRPr sz="1600" kern="1200">
-                <a:solidFill>
-                  <a:schemeClr val="tx1"/>
-                </a:solidFill>
-                <a:latin typeface="+mn-lt"/>
-                <a:ea typeface="+mn-ea"/>
-                <a:cs typeface="+mn-cs"/>
-              </a:defRPr>
-            </a:lvl8pPr>
-            <a:lvl9pPr marL="3657600" indent="0" algn="ctr" defTabSz="914400" rtl="0" eaLnBrk="1" latinLnBrk="0" hangingPunct="1">
-              <a:lnSpc>
-                <a:spcPct val="90000"/>
-              </a:lnSpc>
-              <a:spcBef>
-                <a:spcPts val="500"/>
-              </a:spcBef>
-              <a:buFont typeface="Arial" panose="020B0604020202020204" pitchFamily="34" charset="0"/>
-              <a:buNone/>
-              <a:defRPr sz="1600" kern="1200">
-                <a:solidFill>
-                  <a:schemeClr val="tx1"/>
-                </a:solidFill>
-                <a:latin typeface="+mn-lt"/>
-                <a:ea typeface="+mn-ea"/>
-                <a:cs typeface="+mn-cs"/>
-              </a:defRPr>
-            </a:lvl9pPr>
-          </a:lstStyle>
-          <a:p>
-            <a:pPr algn="l"/>
-            <a:r>
-              <a:rPr lang="en-US" dirty="0"/>
-              <a:t>Axions </a:t>
-            </a:r>
-          </a:p>
-          <a:p>
-            <a:pPr marL="342900" indent="-342900" algn="l">
-              <a:buFont typeface="Arial" panose="020B0604020202020204" pitchFamily="34" charset="0"/>
-              <a:buChar char="•"/>
-            </a:pPr>
-            <a:r>
-              <a:rPr lang="en-US" dirty="0"/>
-              <a:t>Originate as a by-product of the Peccei Quinn mechanism introduced to explain why strongly interacting hadrons are CP-symmetric in the low energy limit.</a:t>
-            </a:r>
-          </a:p>
-          <a:p>
-            <a:pPr marL="342900" indent="-342900" algn="l">
-              <a:buFont typeface="Arial" panose="020B0604020202020204" pitchFamily="34" charset="0"/>
-              <a:buChar char="•"/>
-            </a:pPr>
-            <a:r>
-              <a:rPr lang="en-US" dirty="0"/>
-              <a:t>Are associated with the strong interactions, so the axion mass is far lower than the WIMP mass, with its mass constrained by astrophysical observations and cosmological arguments. See a later lecture for further </a:t>
-            </a:r>
-            <a:r>
-              <a:rPr lang="en-US" dirty="0" err="1"/>
-              <a:t>disussion</a:t>
-            </a:r>
-            <a:endParaRPr lang="en-US" dirty="0"/>
-          </a:p>
-          <a:p>
-            <a:pPr marL="342900" indent="-342900" algn="l">
-              <a:buFont typeface="Arial" panose="020B0604020202020204" pitchFamily="34" charset="0"/>
-              <a:buChar char="•"/>
-            </a:pPr>
-            <a:r>
-              <a:rPr lang="en-US" dirty="0"/>
-              <a:t>Are wave-like, if they are dark matter.</a:t>
-            </a:r>
-          </a:p>
-          <a:p>
-            <a:pPr marL="342900" indent="-342900" algn="l">
-              <a:buFont typeface="Arial" panose="020B0604020202020204" pitchFamily="34" charset="0"/>
-              <a:buChar char="•"/>
-            </a:pPr>
-            <a:r>
-              <a:rPr lang="en-US" dirty="0"/>
-              <a:t>Have De Broglie wavelengths of order a hundred </a:t>
-            </a:r>
-            <a:r>
-              <a:rPr lang="en-US" dirty="0" err="1"/>
-              <a:t>metres</a:t>
-            </a:r>
-            <a:r>
-              <a:rPr lang="en-US" dirty="0"/>
-              <a:t>.</a:t>
-            </a:r>
-          </a:p>
-        </p:txBody>
-      </p:sp>
+          <a:lstStyle/>
+          <a:p>
+            <a:r>
+              <a:rPr lang="en-US" sz="2800" dirty="0"/>
+              <a:t>In the non relativistic limit, </a:t>
+            </a:r>
+          </a:p>
+        </p:txBody>
+      </p:sp>
+      <p:pic>
+        <p:nvPicPr>
+          <p:cNvPr id="5" name="Picture 4">
+            <a:extLst>
+              <a:ext uri="{FF2B5EF4-FFF2-40B4-BE49-F238E27FC236}">
+                <a16:creationId xmlns:a16="http://schemas.microsoft.com/office/drawing/2014/main" id="{4D28C314-636E-A2FE-9B2D-6C2E3C82D0F4}"/>
+              </a:ext>
+            </a:extLst>
+          </p:cNvPr>
+          <p:cNvPicPr>
+            <a:picLocks noChangeAspect="1"/>
+          </p:cNvPicPr>
+          <p:nvPr/>
+        </p:nvPicPr>
+        <p:blipFill>
+          <a:blip r:embed="rId3"/>
+          <a:stretch>
+            <a:fillRect/>
+          </a:stretch>
+        </p:blipFill>
+        <p:spPr>
+          <a:xfrm>
+            <a:off x="5095103" y="2220156"/>
+            <a:ext cx="2743200" cy="1397000"/>
+          </a:xfrm>
+          <a:prstGeom prst="rect">
+            <a:avLst/>
+          </a:prstGeom>
+        </p:spPr>
+      </p:pic>
+      <p:pic>
+        <p:nvPicPr>
+          <p:cNvPr id="8" name="Picture 7">
+            <a:extLst>
+              <a:ext uri="{FF2B5EF4-FFF2-40B4-BE49-F238E27FC236}">
+                <a16:creationId xmlns:a16="http://schemas.microsoft.com/office/drawing/2014/main" id="{4E44DCEB-DDA8-5F8E-B745-DE84909E48D5}"/>
+              </a:ext>
+            </a:extLst>
+          </p:cNvPr>
+          <p:cNvPicPr>
+            <a:picLocks noChangeAspect="1"/>
+          </p:cNvPicPr>
+          <p:nvPr/>
+        </p:nvPicPr>
+        <p:blipFill>
+          <a:blip r:embed="rId4"/>
+          <a:stretch>
+            <a:fillRect/>
+          </a:stretch>
+        </p:blipFill>
+        <p:spPr>
+          <a:xfrm>
+            <a:off x="4589969" y="3807138"/>
+            <a:ext cx="4775200" cy="1130300"/>
+          </a:xfrm>
+          <a:prstGeom prst="rect">
+            <a:avLst/>
+          </a:prstGeom>
+        </p:spPr>
+      </p:pic>
+      <p:grpSp>
+        <p:nvGrpSpPr>
+          <p:cNvPr id="10" name="Group 9">
+            <a:extLst>
+              <a:ext uri="{FF2B5EF4-FFF2-40B4-BE49-F238E27FC236}">
+                <a16:creationId xmlns:a16="http://schemas.microsoft.com/office/drawing/2014/main" id="{12EF91CB-1826-BCF3-4DC6-243128FB9410}"/>
+              </a:ext>
+            </a:extLst>
+          </p:cNvPr>
+          <p:cNvGrpSpPr/>
+          <p:nvPr/>
+        </p:nvGrpSpPr>
+        <p:grpSpPr>
+          <a:xfrm>
+            <a:off x="270132" y="5127420"/>
+            <a:ext cx="11651736" cy="1815882"/>
+            <a:chOff x="270132" y="5127420"/>
+            <a:chExt cx="11651736" cy="1815882"/>
+          </a:xfrm>
+        </p:grpSpPr>
+        <p:sp>
+          <p:nvSpPr>
+            <p:cNvPr id="7" name="TextBox 6">
+              <a:extLst>
+                <a:ext uri="{FF2B5EF4-FFF2-40B4-BE49-F238E27FC236}">
+                  <a16:creationId xmlns:a16="http://schemas.microsoft.com/office/drawing/2014/main" id="{3525F10A-3995-D418-E265-4281D207149C}"/>
+                </a:ext>
+              </a:extLst>
+            </p:cNvPr>
+            <p:cNvSpPr txBox="1"/>
+            <p:nvPr/>
+          </p:nvSpPr>
+          <p:spPr>
+            <a:xfrm>
+              <a:off x="270132" y="5127420"/>
+              <a:ext cx="11651736" cy="1815882"/>
+            </a:xfrm>
+            <a:prstGeom prst="rect">
+              <a:avLst/>
+            </a:prstGeom>
+            <a:noFill/>
+          </p:spPr>
+          <p:txBody>
+            <a:bodyPr wrap="square" rtlCol="0">
+              <a:spAutoFit/>
+            </a:bodyPr>
+            <a:lstStyle/>
+            <a:p>
+              <a:r>
+                <a:rPr lang="en-US" sz="2800" dirty="0"/>
+                <a:t>The mc</a:t>
+              </a:r>
+              <a:r>
+                <a:rPr lang="en-US" sz="2800" baseline="30000" dirty="0"/>
+                <a:t>2</a:t>
+              </a:r>
+              <a:r>
+                <a:rPr lang="en-US" sz="2800" dirty="0"/>
+                <a:t> term is the energy of the particle at rest, or its rest mass in GeV/c</a:t>
+              </a:r>
+              <a:r>
+                <a:rPr lang="en-US" sz="2800" baseline="30000" dirty="0"/>
+                <a:t>2</a:t>
+              </a:r>
+              <a:r>
+                <a:rPr lang="en-US" sz="2800" dirty="0"/>
+                <a:t>.</a:t>
+              </a:r>
+            </a:p>
+            <a:p>
+              <a:r>
+                <a:rPr lang="en-US" sz="2800" dirty="0"/>
+                <a:t> I’ve used                                  , a convenient thing to remember that comes in handy a lot. The quantity (v/c) is dimensionless; just make sure the units for v and c match. The answer is in femtometers.</a:t>
+              </a:r>
+            </a:p>
+          </p:txBody>
+        </p:sp>
+        <p:pic>
+          <p:nvPicPr>
+            <p:cNvPr id="9" name="Picture 8">
+              <a:extLst>
+                <a:ext uri="{FF2B5EF4-FFF2-40B4-BE49-F238E27FC236}">
+                  <a16:creationId xmlns:a16="http://schemas.microsoft.com/office/drawing/2014/main" id="{F2756C79-BE20-89AD-FE25-96A561A9AAFB}"/>
+                </a:ext>
+              </a:extLst>
+            </p:cNvPr>
+            <p:cNvPicPr>
+              <a:picLocks noChangeAspect="1"/>
+            </p:cNvPicPr>
+            <p:nvPr/>
+          </p:nvPicPr>
+          <p:blipFill>
+            <a:blip r:embed="rId5"/>
+            <a:stretch>
+              <a:fillRect/>
+            </a:stretch>
+          </p:blipFill>
+          <p:spPr>
+            <a:xfrm>
+              <a:off x="1952367" y="5670933"/>
+              <a:ext cx="2174790" cy="242606"/>
+            </a:xfrm>
+            <a:prstGeom prst="rect">
+              <a:avLst/>
+            </a:prstGeom>
+          </p:spPr>
+        </p:pic>
+      </p:grpSp>
     </p:spTree>
     <p:extLst>
       <p:ext uri="{BB962C8B-B14F-4D97-AF65-F5344CB8AC3E}">
-        <p14:creationId xmlns:p14="http://schemas.microsoft.com/office/powerpoint/2010/main" val="745341166"/>
+        <p14:creationId xmlns:p14="http://schemas.microsoft.com/office/powerpoint/2010/main" val="2316083740"/>
       </p:ext>
     </p:extLst>
   </p:cSld>

</xml_diff>

<commit_message>
Added illustrative slides and an additional figure for the notes.
</commit_message>
<xml_diff>
--- a/chapter1/figures/lecture_1_illustrations.pptx
+++ b/chapter1/figures/lecture_1_illustrations.pptx
@@ -270,7 +270,7 @@
           <a:p>
             <a:fld id="{7908B4D3-8E7B-5740-BB50-91FF3027E42A}" type="datetimeFigureOut">
               <a:rPr lang="en-US" smtClean="0"/>
-              <a:t>11/17/25</a:t>
+              <a:t>11/19/25</a:t>
             </a:fld>
             <a:endParaRPr lang="en-US"/>
           </a:p>
@@ -470,7 +470,7 @@
           <a:p>
             <a:fld id="{7908B4D3-8E7B-5740-BB50-91FF3027E42A}" type="datetimeFigureOut">
               <a:rPr lang="en-US" smtClean="0"/>
-              <a:t>11/17/25</a:t>
+              <a:t>11/19/25</a:t>
             </a:fld>
             <a:endParaRPr lang="en-US"/>
           </a:p>
@@ -680,7 +680,7 @@
           <a:p>
             <a:fld id="{7908B4D3-8E7B-5740-BB50-91FF3027E42A}" type="datetimeFigureOut">
               <a:rPr lang="en-US" smtClean="0"/>
-              <a:t>11/17/25</a:t>
+              <a:t>11/19/25</a:t>
             </a:fld>
             <a:endParaRPr lang="en-US"/>
           </a:p>
@@ -1005,7 +1005,7 @@
           <a:p>
             <a:fld id="{7908B4D3-8E7B-5740-BB50-91FF3027E42A}" type="datetimeFigureOut">
               <a:rPr lang="en-US" smtClean="0"/>
-              <a:t>11/17/25</a:t>
+              <a:t>11/19/25</a:t>
             </a:fld>
             <a:endParaRPr lang="en-US"/>
           </a:p>
@@ -1281,7 +1281,7 @@
           <a:p>
             <a:fld id="{7908B4D3-8E7B-5740-BB50-91FF3027E42A}" type="datetimeFigureOut">
               <a:rPr lang="en-US" smtClean="0"/>
-              <a:t>11/17/25</a:t>
+              <a:t>11/19/25</a:t>
             </a:fld>
             <a:endParaRPr lang="en-US"/>
           </a:p>
@@ -1549,7 +1549,7 @@
           <a:p>
             <a:fld id="{7908B4D3-8E7B-5740-BB50-91FF3027E42A}" type="datetimeFigureOut">
               <a:rPr lang="en-US" smtClean="0"/>
-              <a:t>11/17/25</a:t>
+              <a:t>11/19/25</a:t>
             </a:fld>
             <a:endParaRPr lang="en-US"/>
           </a:p>
@@ -1964,7 +1964,7 @@
           <a:p>
             <a:fld id="{7908B4D3-8E7B-5740-BB50-91FF3027E42A}" type="datetimeFigureOut">
               <a:rPr lang="en-US" smtClean="0"/>
-              <a:t>11/17/25</a:t>
+              <a:t>11/19/25</a:t>
             </a:fld>
             <a:endParaRPr lang="en-US"/>
           </a:p>
@@ -2106,7 +2106,7 @@
           <a:p>
             <a:fld id="{7908B4D3-8E7B-5740-BB50-91FF3027E42A}" type="datetimeFigureOut">
               <a:rPr lang="en-US" smtClean="0"/>
-              <a:t>11/17/25</a:t>
+              <a:t>11/19/25</a:t>
             </a:fld>
             <a:endParaRPr lang="en-US"/>
           </a:p>
@@ -2219,7 +2219,7 @@
           <a:p>
             <a:fld id="{7908B4D3-8E7B-5740-BB50-91FF3027E42A}" type="datetimeFigureOut">
               <a:rPr lang="en-US" smtClean="0"/>
-              <a:t>11/17/25</a:t>
+              <a:t>11/19/25</a:t>
             </a:fld>
             <a:endParaRPr lang="en-US"/>
           </a:p>
@@ -2532,7 +2532,7 @@
           <a:p>
             <a:fld id="{7908B4D3-8E7B-5740-BB50-91FF3027E42A}" type="datetimeFigureOut">
               <a:rPr lang="en-US" smtClean="0"/>
-              <a:t>11/17/25</a:t>
+              <a:t>11/19/25</a:t>
             </a:fld>
             <a:endParaRPr lang="en-US"/>
           </a:p>
@@ -2821,7 +2821,7 @@
           <a:p>
             <a:fld id="{7908B4D3-8E7B-5740-BB50-91FF3027E42A}" type="datetimeFigureOut">
               <a:rPr lang="en-US" smtClean="0"/>
-              <a:t>11/17/25</a:t>
+              <a:t>11/19/25</a:t>
             </a:fld>
             <a:endParaRPr lang="en-US"/>
           </a:p>
@@ -3064,7 +3064,7 @@
           <a:p>
             <a:fld id="{7908B4D3-8E7B-5740-BB50-91FF3027E42A}" type="datetimeFigureOut">
               <a:rPr lang="en-US" smtClean="0"/>
-              <a:t>11/17/25</a:t>
+              <a:t>11/19/25</a:t>
             </a:fld>
             <a:endParaRPr lang="en-US"/>
           </a:p>
@@ -4865,7 +4865,7 @@
             <a:effectLst/>
             <a:extLst>
               <a:ext uri="{C572A759-6A51-4108-AA02-DFA0A04FC94B}">
-                <ma14:wrappingTextBoxFlag xmlns:ma14="http://schemas.microsoft.com/office/mac/drawingml/2011/main" xmlns:a14="http://schemas.microsoft.com/office/drawing/2010/main" xmlns:m="http://schemas.openxmlformats.org/officeDocument/2006/math" xmlns="" val="1"/>
+                <ma14:wrappingTextBoxFlag xmlns="" xmlns:m="http://schemas.openxmlformats.org/officeDocument/2006/math" xmlns:a14="http://schemas.microsoft.com/office/drawing/2010/main" xmlns:ma14="http://schemas.microsoft.com/office/mac/drawingml/2011/main" val="1"/>
               </a:ext>
             </a:extLst>
           </p:spPr>
@@ -5032,7 +5032,7 @@
           <a:effectLst/>
           <a:extLst>
             <a:ext uri="{C572A759-6A51-4108-AA02-DFA0A04FC94B}">
-              <ma14:wrappingTextBoxFlag xmlns:ma14="http://schemas.microsoft.com/office/mac/drawingml/2011/main" xmlns:a14="http://schemas.microsoft.com/office/drawing/2010/main" xmlns:m="http://schemas.openxmlformats.org/officeDocument/2006/math" xmlns="" val="1"/>
+              <ma14:wrappingTextBoxFlag xmlns="" xmlns:m="http://schemas.openxmlformats.org/officeDocument/2006/math" xmlns:a14="http://schemas.microsoft.com/office/drawing/2010/main" xmlns:ma14="http://schemas.microsoft.com/office/mac/drawingml/2011/main" val="1"/>
             </a:ext>
           </a:extLst>
         </p:spPr>

</xml_diff>